<commit_message>
Added capability to make birthday slide using data.csv
</commit_message>
<xml_diff>
--- a/template.pptx
+++ b/template.pptx
@@ -254,7 +254,7 @@
       </p15:sldGuideLst>
     </p:ext>
     <p:ext uri="GoogleSlidesCustomDataVersion2">
-      <go:slidesCustomData xmlns:go="http://customooxmlschemas.google.com/" xmlns:ahyp="http://schemas.microsoft.com/office/drawing/2018/hyperlinkcolor" xmlns:p15="http://schemas.microsoft.com/office/powerpoint/2012/main" xmlns:p14="http://schemas.microsoft.com/office/powerpoint/2010/main" xmlns:com="http://schemas.openxmlformats.org/drawingml/2006/compatibility" xmlns:pvml="urn:schemas-microsoft-com:office:powerpoint" xmlns:v="urn:schemas-microsoft-com:vml" xmlns:o="urn:schemas-microsoft-com:office:office" xmlns:dgm="http://schemas.openxmlformats.org/drawingml/2006/diagram" xmlns:c="http://schemas.openxmlformats.org/drawingml/2006/chart" xmlns:mv="urn:schemas-microsoft-com:mac:vml" xmlns:mc="http://schemas.openxmlformats.org/markup-compatibility/2006" xmlns="" r:id="rId61" roundtripDataSignature="AMtx7mg9/oIDjS/3rrO1BH3fkJZfa7OyHQ=="/>
+      <go:slidesCustomData xmlns="" xmlns:mc="http://schemas.openxmlformats.org/markup-compatibility/2006" xmlns:mv="urn:schemas-microsoft-com:mac:vml" xmlns:c="http://schemas.openxmlformats.org/drawingml/2006/chart" xmlns:dgm="http://schemas.openxmlformats.org/drawingml/2006/diagram" xmlns:o="urn:schemas-microsoft-com:office:office" xmlns:v="urn:schemas-microsoft-com:vml" xmlns:pvml="urn:schemas-microsoft-com:office:powerpoint" xmlns:com="http://schemas.openxmlformats.org/drawingml/2006/compatibility" xmlns:p14="http://schemas.microsoft.com/office/powerpoint/2010/main" xmlns:p15="http://schemas.microsoft.com/office/powerpoint/2012/main" xmlns:ahyp="http://schemas.microsoft.com/office/drawing/2018/hyperlinkcolor" xmlns:go="http://customooxmlschemas.google.com/" r:id="rId61" roundtripDataSignature="AMtx7mg9/oIDjS/3rrO1BH3fkJZfa7OyHQ=="/>
     </p:ext>
   </p:extLst>
 </p:presentation>
@@ -2125,6 +2125,1325 @@
 </p:sldLayout>
 </file>
 
+<file path=ppt/slideLayouts/slideLayout12.xml><?xml version="1.0" encoding="utf-8"?>
+<p:sldLayout xmlns:a="http://schemas.openxmlformats.org/drawingml/2006/main" xmlns:r="http://schemas.openxmlformats.org/officeDocument/2006/relationships" xmlns:p="http://schemas.openxmlformats.org/presentationml/2006/main" preserve="1" userDrawn="1">
+  <p:cSld name="Custom Layout">
+    <p:spTree>
+      <p:nvGrpSpPr>
+        <p:cNvPr id="1" name=""/>
+        <p:cNvGrpSpPr/>
+        <p:nvPr/>
+      </p:nvGrpSpPr>
+      <p:grpSpPr>
+        <a:xfrm>
+          <a:off x="0" y="0"/>
+          <a:ext cx="0" cy="0"/>
+          <a:chOff x="0" y="0"/>
+          <a:chExt cx="0" cy="0"/>
+        </a:xfrm>
+      </p:grpSpPr>
+      <p:sp>
+        <p:nvSpPr>
+          <p:cNvPr id="5" name="Google Shape;71;p2">
+            <a:extLst>
+              <a:ext uri="{FF2B5EF4-FFF2-40B4-BE49-F238E27FC236}">
+                <a16:creationId xmlns:a16="http://schemas.microsoft.com/office/drawing/2014/main" id="{2373C5B3-6ED4-73B6-8FFC-257516DD0942}"/>
+              </a:ext>
+            </a:extLst>
+          </p:cNvPr>
+          <p:cNvSpPr txBox="1">
+            <a:spLocks/>
+          </p:cNvSpPr>
+          <p:nvPr userDrawn="1"/>
+        </p:nvSpPr>
+        <p:spPr>
+          <a:xfrm>
+            <a:off x="1835700" y="230054"/>
+            <a:ext cx="8520600" cy="1128600"/>
+          </a:xfrm>
+          <a:prstGeom prst="rect">
+            <a:avLst/>
+          </a:prstGeom>
+          <a:noFill/>
+          <a:ln>
+            <a:noFill/>
+          </a:ln>
+        </p:spPr>
+        <p:txBody>
+          <a:bodyPr spcFirstLastPara="1" wrap="square" lIns="91425" tIns="91425" rIns="91425" bIns="91425" anchor="t" anchorCtr="0">
+            <a:noAutofit/>
+          </a:bodyPr>
+          <a:lstStyle>
+            <a:defPPr marR="0" lvl="0" algn="l" rtl="0">
+              <a:lnSpc>
+                <a:spcPct val="100000"/>
+              </a:lnSpc>
+              <a:spcBef>
+                <a:spcPts val="0"/>
+              </a:spcBef>
+              <a:spcAft>
+                <a:spcPts val="0"/>
+              </a:spcAft>
+            </a:defPPr>
+            <a:lvl1pPr marR="0" lvl="0" algn="l" rtl="0">
+              <a:lnSpc>
+                <a:spcPct val="100000"/>
+              </a:lnSpc>
+              <a:spcBef>
+                <a:spcPts val="0"/>
+              </a:spcBef>
+              <a:spcAft>
+                <a:spcPts val="0"/>
+              </a:spcAft>
+              <a:buClr>
+                <a:schemeClr val="dk1"/>
+              </a:buClr>
+              <a:buSzPts val="2800"/>
+              <a:buFont typeface="Arial"/>
+              <a:buNone/>
+              <a:defRPr sz="2800" b="0" i="0" u="none" strike="noStrike" cap="none">
+                <a:solidFill>
+                  <a:schemeClr val="dk1"/>
+                </a:solidFill>
+                <a:latin typeface="Arial"/>
+                <a:ea typeface="Arial"/>
+                <a:cs typeface="Arial"/>
+                <a:sym typeface="Arial"/>
+              </a:defRPr>
+            </a:lvl1pPr>
+            <a:lvl2pPr marR="0" lvl="1" algn="l" rtl="0">
+              <a:lnSpc>
+                <a:spcPct val="100000"/>
+              </a:lnSpc>
+              <a:spcBef>
+                <a:spcPts val="0"/>
+              </a:spcBef>
+              <a:spcAft>
+                <a:spcPts val="0"/>
+              </a:spcAft>
+              <a:buClr>
+                <a:schemeClr val="dk1"/>
+              </a:buClr>
+              <a:buSzPts val="2800"/>
+              <a:buFont typeface="Arial"/>
+              <a:buNone/>
+              <a:defRPr sz="2800" b="0" i="0" u="none" strike="noStrike" cap="none">
+                <a:solidFill>
+                  <a:schemeClr val="dk1"/>
+                </a:solidFill>
+                <a:latin typeface="Arial"/>
+                <a:ea typeface="Arial"/>
+                <a:cs typeface="Arial"/>
+                <a:sym typeface="Arial"/>
+              </a:defRPr>
+            </a:lvl2pPr>
+            <a:lvl3pPr marR="0" lvl="2" algn="l" rtl="0">
+              <a:lnSpc>
+                <a:spcPct val="100000"/>
+              </a:lnSpc>
+              <a:spcBef>
+                <a:spcPts val="0"/>
+              </a:spcBef>
+              <a:spcAft>
+                <a:spcPts val="0"/>
+              </a:spcAft>
+              <a:buClr>
+                <a:schemeClr val="dk1"/>
+              </a:buClr>
+              <a:buSzPts val="2800"/>
+              <a:buFont typeface="Arial"/>
+              <a:buNone/>
+              <a:defRPr sz="2800" b="0" i="0" u="none" strike="noStrike" cap="none">
+                <a:solidFill>
+                  <a:schemeClr val="dk1"/>
+                </a:solidFill>
+                <a:latin typeface="Arial"/>
+                <a:ea typeface="Arial"/>
+                <a:cs typeface="Arial"/>
+                <a:sym typeface="Arial"/>
+              </a:defRPr>
+            </a:lvl3pPr>
+            <a:lvl4pPr marR="0" lvl="3" algn="l" rtl="0">
+              <a:lnSpc>
+                <a:spcPct val="100000"/>
+              </a:lnSpc>
+              <a:spcBef>
+                <a:spcPts val="0"/>
+              </a:spcBef>
+              <a:spcAft>
+                <a:spcPts val="0"/>
+              </a:spcAft>
+              <a:buClr>
+                <a:schemeClr val="dk1"/>
+              </a:buClr>
+              <a:buSzPts val="2800"/>
+              <a:buFont typeface="Arial"/>
+              <a:buNone/>
+              <a:defRPr sz="2800" b="0" i="0" u="none" strike="noStrike" cap="none">
+                <a:solidFill>
+                  <a:schemeClr val="dk1"/>
+                </a:solidFill>
+                <a:latin typeface="Arial"/>
+                <a:ea typeface="Arial"/>
+                <a:cs typeface="Arial"/>
+                <a:sym typeface="Arial"/>
+              </a:defRPr>
+            </a:lvl4pPr>
+            <a:lvl5pPr marR="0" lvl="4" algn="l" rtl="0">
+              <a:lnSpc>
+                <a:spcPct val="100000"/>
+              </a:lnSpc>
+              <a:spcBef>
+                <a:spcPts val="0"/>
+              </a:spcBef>
+              <a:spcAft>
+                <a:spcPts val="0"/>
+              </a:spcAft>
+              <a:buClr>
+                <a:schemeClr val="dk1"/>
+              </a:buClr>
+              <a:buSzPts val="2800"/>
+              <a:buFont typeface="Arial"/>
+              <a:buNone/>
+              <a:defRPr sz="2800" b="0" i="0" u="none" strike="noStrike" cap="none">
+                <a:solidFill>
+                  <a:schemeClr val="dk1"/>
+                </a:solidFill>
+                <a:latin typeface="Arial"/>
+                <a:ea typeface="Arial"/>
+                <a:cs typeface="Arial"/>
+                <a:sym typeface="Arial"/>
+              </a:defRPr>
+            </a:lvl5pPr>
+            <a:lvl6pPr marR="0" lvl="5" algn="l" rtl="0">
+              <a:lnSpc>
+                <a:spcPct val="100000"/>
+              </a:lnSpc>
+              <a:spcBef>
+                <a:spcPts val="0"/>
+              </a:spcBef>
+              <a:spcAft>
+                <a:spcPts val="0"/>
+              </a:spcAft>
+              <a:buClr>
+                <a:schemeClr val="dk1"/>
+              </a:buClr>
+              <a:buSzPts val="2800"/>
+              <a:buFont typeface="Arial"/>
+              <a:buNone/>
+              <a:defRPr sz="2800" b="0" i="0" u="none" strike="noStrike" cap="none">
+                <a:solidFill>
+                  <a:schemeClr val="dk1"/>
+                </a:solidFill>
+                <a:latin typeface="Arial"/>
+                <a:ea typeface="Arial"/>
+                <a:cs typeface="Arial"/>
+                <a:sym typeface="Arial"/>
+              </a:defRPr>
+            </a:lvl6pPr>
+            <a:lvl7pPr marR="0" lvl="6" algn="l" rtl="0">
+              <a:lnSpc>
+                <a:spcPct val="100000"/>
+              </a:lnSpc>
+              <a:spcBef>
+                <a:spcPts val="0"/>
+              </a:spcBef>
+              <a:spcAft>
+                <a:spcPts val="0"/>
+              </a:spcAft>
+              <a:buClr>
+                <a:schemeClr val="dk1"/>
+              </a:buClr>
+              <a:buSzPts val="2800"/>
+              <a:buFont typeface="Arial"/>
+              <a:buNone/>
+              <a:defRPr sz="2800" b="0" i="0" u="none" strike="noStrike" cap="none">
+                <a:solidFill>
+                  <a:schemeClr val="dk1"/>
+                </a:solidFill>
+                <a:latin typeface="Arial"/>
+                <a:ea typeface="Arial"/>
+                <a:cs typeface="Arial"/>
+                <a:sym typeface="Arial"/>
+              </a:defRPr>
+            </a:lvl7pPr>
+            <a:lvl8pPr marR="0" lvl="7" algn="l" rtl="0">
+              <a:lnSpc>
+                <a:spcPct val="100000"/>
+              </a:lnSpc>
+              <a:spcBef>
+                <a:spcPts val="0"/>
+              </a:spcBef>
+              <a:spcAft>
+                <a:spcPts val="0"/>
+              </a:spcAft>
+              <a:buClr>
+                <a:schemeClr val="dk1"/>
+              </a:buClr>
+              <a:buSzPts val="2800"/>
+              <a:buFont typeface="Arial"/>
+              <a:buNone/>
+              <a:defRPr sz="2800" b="0" i="0" u="none" strike="noStrike" cap="none">
+                <a:solidFill>
+                  <a:schemeClr val="dk1"/>
+                </a:solidFill>
+                <a:latin typeface="Arial"/>
+                <a:ea typeface="Arial"/>
+                <a:cs typeface="Arial"/>
+                <a:sym typeface="Arial"/>
+              </a:defRPr>
+            </a:lvl8pPr>
+            <a:lvl9pPr marR="0" lvl="8" algn="l" rtl="0">
+              <a:lnSpc>
+                <a:spcPct val="100000"/>
+              </a:lnSpc>
+              <a:spcBef>
+                <a:spcPts val="0"/>
+              </a:spcBef>
+              <a:spcAft>
+                <a:spcPts val="0"/>
+              </a:spcAft>
+              <a:buClr>
+                <a:schemeClr val="dk1"/>
+              </a:buClr>
+              <a:buSzPts val="2800"/>
+              <a:buFont typeface="Arial"/>
+              <a:buNone/>
+              <a:defRPr sz="2800" b="0" i="0" u="none" strike="noStrike" cap="none">
+                <a:solidFill>
+                  <a:schemeClr val="dk1"/>
+                </a:solidFill>
+                <a:latin typeface="Arial"/>
+                <a:ea typeface="Arial"/>
+                <a:cs typeface="Arial"/>
+                <a:sym typeface="Arial"/>
+              </a:defRPr>
+            </a:lvl9pPr>
+          </a:lstStyle>
+          <a:p>
+            <a:pPr algn="ctr">
+              <a:buSzPts val="1100"/>
+            </a:pPr>
+            <a:r>
+              <a:rPr lang="en-GB" sz="3400" b="1"/>
+              <a:t>Intensi Misa</a:t>
+            </a:r>
+          </a:p>
+          <a:p>
+            <a:pPr algn="ctr"/>
+            <a:r>
+              <a:rPr lang="en-GB" sz="2400" b="1" i="1">
+                <a:solidFill>
+                  <a:srgbClr val="752224"/>
+                </a:solidFill>
+              </a:rPr>
+              <a:t>Mass Intentions</a:t>
+            </a:r>
+            <a:endParaRPr lang="en-GB" sz="2400">
+              <a:solidFill>
+                <a:srgbClr val="752224"/>
+              </a:solidFill>
+            </a:endParaRPr>
+          </a:p>
+        </p:txBody>
+      </p:sp>
+      <p:grpSp>
+        <p:nvGrpSpPr>
+          <p:cNvPr id="7" name="Google Shape;73;p2">
+            <a:extLst>
+              <a:ext uri="{FF2B5EF4-FFF2-40B4-BE49-F238E27FC236}">
+                <a16:creationId xmlns:a16="http://schemas.microsoft.com/office/drawing/2014/main" id="{DBD5B5FB-4CBE-93AE-2AC8-49646EFAD4C8}"/>
+              </a:ext>
+            </a:extLst>
+          </p:cNvPr>
+          <p:cNvGrpSpPr/>
+          <p:nvPr userDrawn="1"/>
+        </p:nvGrpSpPr>
+        <p:grpSpPr>
+          <a:xfrm>
+            <a:off x="256540" y="143018"/>
+            <a:ext cx="3283904" cy="1083004"/>
+            <a:chOff x="272097" y="329314"/>
+            <a:chExt cx="3283904" cy="1083004"/>
+          </a:xfrm>
+        </p:grpSpPr>
+        <p:pic>
+          <p:nvPicPr>
+            <p:cNvPr id="8" name="Google Shape;74;p2" descr="A black background with white text&#10;&#10;AI-generated content may be incorrect.">
+              <a:extLst>
+                <a:ext uri="{FF2B5EF4-FFF2-40B4-BE49-F238E27FC236}">
+                  <a16:creationId xmlns:a16="http://schemas.microsoft.com/office/drawing/2014/main" id="{F665A080-F9C0-1FED-E4A5-AFC019E37C96}"/>
+                </a:ext>
+              </a:extLst>
+            </p:cNvPr>
+            <p:cNvPicPr preferRelativeResize="0"/>
+            <p:nvPr/>
+          </p:nvPicPr>
+          <p:blipFill rotWithShape="1">
+            <a:blip r:embed="rId2">
+              <a:alphaModFix/>
+            </a:blip>
+            <a:srcRect l="24743" t="28586"/>
+            <a:stretch/>
+          </p:blipFill>
+          <p:spPr>
+            <a:xfrm>
+              <a:off x="1036320" y="477348"/>
+              <a:ext cx="2371725" cy="738936"/>
+            </a:xfrm>
+            <a:prstGeom prst="rect">
+              <a:avLst/>
+            </a:prstGeom>
+            <a:noFill/>
+            <a:ln>
+              <a:noFill/>
+            </a:ln>
+          </p:spPr>
+        </p:pic>
+        <p:sp>
+          <p:nvSpPr>
+            <p:cNvPr id="9" name="Google Shape;75;p2">
+              <a:extLst>
+                <a:ext uri="{FF2B5EF4-FFF2-40B4-BE49-F238E27FC236}">
+                  <a16:creationId xmlns:a16="http://schemas.microsoft.com/office/drawing/2014/main" id="{999A2E09-6706-4B1F-19FA-306B25B9EDC8}"/>
+                </a:ext>
+              </a:extLst>
+            </p:cNvPr>
+            <p:cNvSpPr txBox="1"/>
+            <p:nvPr/>
+          </p:nvSpPr>
+          <p:spPr>
+            <a:xfrm>
+              <a:off x="1036321" y="981461"/>
+              <a:ext cx="2519680" cy="430857"/>
+            </a:xfrm>
+            <a:prstGeom prst="rect">
+              <a:avLst/>
+            </a:prstGeom>
+            <a:noFill/>
+            <a:ln>
+              <a:noFill/>
+            </a:ln>
+          </p:spPr>
+          <p:txBody>
+            <a:bodyPr spcFirstLastPara="1" wrap="square" lIns="91425" tIns="91425" rIns="91425" bIns="91425" anchor="t" anchorCtr="0">
+              <a:spAutoFit/>
+            </a:bodyPr>
+            <a:lstStyle/>
+            <a:p>
+              <a:pPr marL="0" marR="0" lvl="0" indent="0" algn="l" rtl="0">
+                <a:lnSpc>
+                  <a:spcPct val="100000"/>
+                </a:lnSpc>
+                <a:spcBef>
+                  <a:spcPts val="0"/>
+                </a:spcBef>
+                <a:spcAft>
+                  <a:spcPts val="0"/>
+                </a:spcAft>
+                <a:buClr>
+                  <a:srgbClr val="000000"/>
+                </a:buClr>
+                <a:buSzPts val="1500"/>
+                <a:buFont typeface="Arial"/>
+                <a:buNone/>
+              </a:pPr>
+              <a:r>
+                <a:rPr lang="en-GB" sz="1500" b="1" i="0" u="sng" strike="noStrike" cap="none">
+                  <a:solidFill>
+                    <a:srgbClr val="262626"/>
+                  </a:solidFill>
+                  <a:latin typeface="Arial"/>
+                  <a:ea typeface="Arial"/>
+                  <a:cs typeface="Arial"/>
+                  <a:sym typeface="Arial"/>
+                  <a:hlinkClick r:id="rId3">
+                    <a:extLst>
+                      <a:ext uri="{A12FA001-AC4F-418D-AE19-62706E023703}">
+                        <ahyp:hlinkClr xmlns:ahyp="http://schemas.microsoft.com/office/drawing/2018/hyperlinkcolor" val="tx"/>
+                      </a:ext>
+                    </a:extLst>
+                  </a:hlinkClick>
+                </a:rPr>
+                <a:t>multiculturalcare.org.au</a:t>
+              </a:r>
+              <a:endParaRPr sz="1500" b="1" i="0" u="none" strike="noStrike" cap="none">
+                <a:solidFill>
+                  <a:srgbClr val="262626"/>
+                </a:solidFill>
+                <a:latin typeface="Arial"/>
+                <a:ea typeface="Arial"/>
+                <a:cs typeface="Arial"/>
+                <a:sym typeface="Arial"/>
+              </a:endParaRPr>
+            </a:p>
+          </p:txBody>
+        </p:sp>
+        <p:pic>
+          <p:nvPicPr>
+            <p:cNvPr id="10" name="Google Shape;76;p2" descr="A black background with white text&#10;&#10;AI-generated content may be incorrect.">
+              <a:extLst>
+                <a:ext uri="{FF2B5EF4-FFF2-40B4-BE49-F238E27FC236}">
+                  <a16:creationId xmlns:a16="http://schemas.microsoft.com/office/drawing/2014/main" id="{A154D69B-D815-4EEC-1AA5-71FD81D835E5}"/>
+                </a:ext>
+              </a:extLst>
+            </p:cNvPr>
+            <p:cNvPicPr preferRelativeResize="0"/>
+            <p:nvPr/>
+          </p:nvPicPr>
+          <p:blipFill rotWithShape="1">
+            <a:blip r:embed="rId2">
+              <a:alphaModFix/>
+            </a:blip>
+            <a:srcRect r="75751"/>
+            <a:stretch/>
+          </p:blipFill>
+          <p:spPr>
+            <a:xfrm>
+              <a:off x="272097" y="329314"/>
+              <a:ext cx="764224" cy="1034731"/>
+            </a:xfrm>
+            <a:prstGeom prst="rect">
+              <a:avLst/>
+            </a:prstGeom>
+            <a:noFill/>
+            <a:ln>
+              <a:noFill/>
+            </a:ln>
+          </p:spPr>
+        </p:pic>
+      </p:grpSp>
+      <p:grpSp>
+        <p:nvGrpSpPr>
+          <p:cNvPr id="11" name="Google Shape;77;p2">
+            <a:extLst>
+              <a:ext uri="{FF2B5EF4-FFF2-40B4-BE49-F238E27FC236}">
+                <a16:creationId xmlns:a16="http://schemas.microsoft.com/office/drawing/2014/main" id="{60D45A32-108C-A0C7-FF70-D6E8C7E3297E}"/>
+              </a:ext>
+            </a:extLst>
+          </p:cNvPr>
+          <p:cNvGrpSpPr/>
+          <p:nvPr userDrawn="1"/>
+        </p:nvGrpSpPr>
+        <p:grpSpPr>
+          <a:xfrm>
+            <a:off x="9128384" y="91503"/>
+            <a:ext cx="2807076" cy="1186034"/>
+            <a:chOff x="8918251" y="91503"/>
+            <a:chExt cx="2807076" cy="1186034"/>
+          </a:xfrm>
+        </p:grpSpPr>
+        <p:pic>
+          <p:nvPicPr>
+            <p:cNvPr id="12" name="Google Shape;78;p2" descr="A black background with red text&#10;&#10;AI-generated content may be incorrect.">
+              <a:extLst>
+                <a:ext uri="{FF2B5EF4-FFF2-40B4-BE49-F238E27FC236}">
+                  <a16:creationId xmlns:a16="http://schemas.microsoft.com/office/drawing/2014/main" id="{4142D047-8F3C-6970-FB2F-BBABCDE53EB7}"/>
+                </a:ext>
+              </a:extLst>
+            </p:cNvPr>
+            <p:cNvPicPr preferRelativeResize="0"/>
+            <p:nvPr/>
+          </p:nvPicPr>
+          <p:blipFill rotWithShape="1">
+            <a:blip r:embed="rId4">
+              <a:alphaModFix/>
+            </a:blip>
+            <a:srcRect l="26046"/>
+            <a:stretch/>
+          </p:blipFill>
+          <p:spPr>
+            <a:xfrm>
+              <a:off x="9682475" y="91503"/>
+              <a:ext cx="2042852" cy="979160"/>
+            </a:xfrm>
+            <a:prstGeom prst="rect">
+              <a:avLst/>
+            </a:prstGeom>
+            <a:noFill/>
+            <a:ln>
+              <a:noFill/>
+            </a:ln>
+          </p:spPr>
+        </p:pic>
+        <p:sp>
+          <p:nvSpPr>
+            <p:cNvPr id="13" name="Google Shape;79;p2">
+              <a:extLst>
+                <a:ext uri="{FF2B5EF4-FFF2-40B4-BE49-F238E27FC236}">
+                  <a16:creationId xmlns:a16="http://schemas.microsoft.com/office/drawing/2014/main" id="{D9A88414-20E6-0481-FC75-6E3C07F3E035}"/>
+                </a:ext>
+              </a:extLst>
+            </p:cNvPr>
+            <p:cNvSpPr txBox="1"/>
+            <p:nvPr/>
+          </p:nvSpPr>
+          <p:spPr>
+            <a:xfrm>
+              <a:off x="9682475" y="846680"/>
+              <a:ext cx="2042852" cy="430857"/>
+            </a:xfrm>
+            <a:prstGeom prst="rect">
+              <a:avLst/>
+            </a:prstGeom>
+            <a:noFill/>
+            <a:ln>
+              <a:noFill/>
+            </a:ln>
+          </p:spPr>
+          <p:txBody>
+            <a:bodyPr spcFirstLastPara="1" wrap="square" lIns="91425" tIns="91425" rIns="91425" bIns="91425" anchor="t" anchorCtr="0">
+              <a:spAutoFit/>
+            </a:bodyPr>
+            <a:lstStyle/>
+            <a:p>
+              <a:pPr marL="0" marR="0" lvl="0" indent="0" algn="l" rtl="0">
+                <a:lnSpc>
+                  <a:spcPct val="100000"/>
+                </a:lnSpc>
+                <a:spcBef>
+                  <a:spcPts val="0"/>
+                </a:spcBef>
+                <a:spcAft>
+                  <a:spcPts val="0"/>
+                </a:spcAft>
+                <a:buClr>
+                  <a:srgbClr val="000000"/>
+                </a:buClr>
+                <a:buSzPts val="1600"/>
+                <a:buFont typeface="Arial"/>
+                <a:buNone/>
+              </a:pPr>
+              <a:r>
+                <a:rPr lang="en-GB" sz="1600" b="1" i="0" u="sng" strike="noStrike" cap="none">
+                  <a:solidFill>
+                    <a:srgbClr val="262626"/>
+                  </a:solidFill>
+                  <a:latin typeface="Arial"/>
+                  <a:ea typeface="Arial"/>
+                  <a:cs typeface="Arial"/>
+                  <a:sym typeface="Arial"/>
+                </a:rPr>
+                <a:t>icfbrisbane.com</a:t>
+              </a:r>
+              <a:endParaRPr sz="1600" b="1" i="0" u="none" strike="noStrike" cap="none">
+                <a:solidFill>
+                  <a:srgbClr val="262626"/>
+                </a:solidFill>
+                <a:latin typeface="Arial"/>
+                <a:ea typeface="Arial"/>
+                <a:cs typeface="Arial"/>
+                <a:sym typeface="Arial"/>
+              </a:endParaRPr>
+            </a:p>
+          </p:txBody>
+        </p:sp>
+        <p:pic>
+          <p:nvPicPr>
+            <p:cNvPr id="14" name="Google Shape;80;p2" descr="A black background with red text&#10;&#10;AI-generated content may be incorrect.">
+              <a:extLst>
+                <a:ext uri="{FF2B5EF4-FFF2-40B4-BE49-F238E27FC236}">
+                  <a16:creationId xmlns:a16="http://schemas.microsoft.com/office/drawing/2014/main" id="{7E98D4CB-3405-4B40-A040-697213ABC3FA}"/>
+                </a:ext>
+              </a:extLst>
+            </p:cNvPr>
+            <p:cNvPicPr preferRelativeResize="0"/>
+            <p:nvPr/>
+          </p:nvPicPr>
+          <p:blipFill rotWithShape="1">
+            <a:blip r:embed="rId4">
+              <a:alphaModFix/>
+            </a:blip>
+            <a:srcRect r="73928"/>
+            <a:stretch/>
+          </p:blipFill>
+          <p:spPr>
+            <a:xfrm>
+              <a:off x="8918251" y="171893"/>
+              <a:ext cx="764224" cy="1039014"/>
+            </a:xfrm>
+            <a:prstGeom prst="rect">
+              <a:avLst/>
+            </a:prstGeom>
+            <a:noFill/>
+            <a:ln>
+              <a:noFill/>
+            </a:ln>
+          </p:spPr>
+        </p:pic>
+      </p:grpSp>
+      <p:sp>
+        <p:nvSpPr>
+          <p:cNvPr id="15" name="TextBox 14">
+            <a:extLst>
+              <a:ext uri="{FF2B5EF4-FFF2-40B4-BE49-F238E27FC236}">
+                <a16:creationId xmlns:a16="http://schemas.microsoft.com/office/drawing/2014/main" id="{A4AAE7AF-80FB-79A6-76CF-C449C5C3DE7A}"/>
+              </a:ext>
+            </a:extLst>
+          </p:cNvPr>
+          <p:cNvSpPr txBox="1"/>
+          <p:nvPr userDrawn="1"/>
+        </p:nvSpPr>
+        <p:spPr>
+          <a:xfrm>
+            <a:off x="487675" y="5052291"/>
+            <a:ext cx="5608200" cy="1231106"/>
+          </a:xfrm>
+          <a:prstGeom prst="rect">
+            <a:avLst/>
+          </a:prstGeom>
+          <a:noFill/>
+        </p:spPr>
+        <p:txBody>
+          <a:bodyPr wrap="square" rtlCol="0">
+            <a:spAutoFit/>
+          </a:bodyPr>
+          <a:lstStyle/>
+          <a:p>
+            <a:pPr marL="0" lvl="0" indent="0" algn="l" rtl="0">
+              <a:lnSpc>
+                <a:spcPct val="100000"/>
+              </a:lnSpc>
+              <a:spcBef>
+                <a:spcPts val="0"/>
+              </a:spcBef>
+              <a:spcAft>
+                <a:spcPts val="0"/>
+              </a:spcAft>
+              <a:buSzPts val="1400"/>
+              <a:buNone/>
+            </a:pPr>
+            <a:endParaRPr lang="en-GB" sz="1400" b="1" dirty="0">
+              <a:solidFill>
+                <a:schemeClr val="dk1"/>
+              </a:solidFill>
+            </a:endParaRPr>
+          </a:p>
+          <a:p>
+            <a:pPr marL="0" lvl="0" indent="0" algn="l" rtl="0">
+              <a:lnSpc>
+                <a:spcPct val="100000"/>
+              </a:lnSpc>
+              <a:spcBef>
+                <a:spcPts val="0"/>
+              </a:spcBef>
+              <a:spcAft>
+                <a:spcPts val="0"/>
+              </a:spcAft>
+              <a:buClr>
+                <a:schemeClr val="dk1"/>
+              </a:buClr>
+              <a:buSzPts val="1100"/>
+              <a:buNone/>
+            </a:pPr>
+            <a:r>
+              <a:rPr lang="en-GB" sz="2300" b="1" dirty="0">
+                <a:solidFill>
+                  <a:schemeClr val="dk1"/>
+                </a:solidFill>
+                <a:latin typeface="Arial"/>
+                <a:ea typeface="Arial"/>
+                <a:cs typeface="Arial"/>
+                <a:sym typeface="Arial"/>
+              </a:rPr>
+              <a:t>Mohon </a:t>
+            </a:r>
+            <a:r>
+              <a:rPr lang="en-GB" sz="2300" b="1" dirty="0" err="1">
+                <a:solidFill>
+                  <a:schemeClr val="dk1"/>
+                </a:solidFill>
+                <a:latin typeface="Arial"/>
+                <a:ea typeface="Arial"/>
+                <a:cs typeface="Arial"/>
+                <a:sym typeface="Arial"/>
+              </a:rPr>
+              <a:t>memberitahu</a:t>
+            </a:r>
+            <a:r>
+              <a:rPr lang="en-GB" sz="2300" b="1" dirty="0">
+                <a:solidFill>
+                  <a:schemeClr val="dk1"/>
+                </a:solidFill>
+                <a:latin typeface="Arial"/>
+                <a:ea typeface="Arial"/>
+                <a:cs typeface="Arial"/>
+                <a:sym typeface="Arial"/>
+              </a:rPr>
+              <a:t> </a:t>
+            </a:r>
+            <a:r>
+              <a:rPr lang="en-GB" sz="2300" b="1" dirty="0" err="1">
+                <a:solidFill>
+                  <a:schemeClr val="dk1"/>
+                </a:solidFill>
+                <a:latin typeface="Arial"/>
+                <a:ea typeface="Arial"/>
+                <a:cs typeface="Arial"/>
+                <a:sym typeface="Arial"/>
+              </a:rPr>
+              <a:t>pengurus</a:t>
+            </a:r>
+            <a:r>
+              <a:rPr lang="en-GB" sz="2300" b="1" dirty="0">
+                <a:solidFill>
+                  <a:schemeClr val="dk1"/>
+                </a:solidFill>
+                <a:latin typeface="Arial"/>
+                <a:ea typeface="Arial"/>
+                <a:cs typeface="Arial"/>
+                <a:sym typeface="Arial"/>
+              </a:rPr>
+              <a:t> </a:t>
+            </a:r>
+            <a:r>
+              <a:rPr lang="en-GB" sz="2300" b="1" dirty="0" err="1">
+                <a:solidFill>
+                  <a:schemeClr val="dk1"/>
+                </a:solidFill>
+                <a:latin typeface="Arial"/>
+                <a:ea typeface="Arial"/>
+                <a:cs typeface="Arial"/>
+                <a:sym typeface="Arial"/>
+              </a:rPr>
+              <a:t>bagi</a:t>
+            </a:r>
+            <a:r>
+              <a:rPr lang="en-GB" sz="2300" b="1" dirty="0">
+                <a:solidFill>
+                  <a:schemeClr val="dk1"/>
+                </a:solidFill>
+                <a:latin typeface="Arial"/>
+                <a:ea typeface="Arial"/>
+                <a:cs typeface="Arial"/>
+                <a:sym typeface="Arial"/>
+              </a:rPr>
+              <a:t> yang </a:t>
+            </a:r>
+            <a:r>
+              <a:rPr lang="en-GB" sz="2300" b="1" dirty="0" err="1">
+                <a:solidFill>
+                  <a:schemeClr val="dk1"/>
+                </a:solidFill>
+                <a:latin typeface="Arial"/>
+                <a:ea typeface="Arial"/>
+                <a:cs typeface="Arial"/>
+                <a:sym typeface="Arial"/>
+              </a:rPr>
+              <a:t>belum</a:t>
+            </a:r>
+            <a:r>
+              <a:rPr lang="en-GB" sz="2300" b="1" dirty="0">
+                <a:solidFill>
+                  <a:schemeClr val="dk1"/>
+                </a:solidFill>
+                <a:latin typeface="Arial"/>
+                <a:ea typeface="Arial"/>
+                <a:cs typeface="Arial"/>
+                <a:sym typeface="Arial"/>
+              </a:rPr>
+              <a:t> </a:t>
+            </a:r>
+            <a:r>
+              <a:rPr lang="en-GB" sz="2300" b="1" dirty="0" err="1">
+                <a:solidFill>
+                  <a:schemeClr val="dk1"/>
+                </a:solidFill>
+                <a:latin typeface="Arial"/>
+                <a:ea typeface="Arial"/>
+                <a:cs typeface="Arial"/>
+                <a:sym typeface="Arial"/>
+              </a:rPr>
+              <a:t>tercantum</a:t>
+            </a:r>
+            <a:r>
+              <a:rPr lang="en-GB" sz="2300" b="1" dirty="0">
+                <a:solidFill>
+                  <a:schemeClr val="dk1"/>
+                </a:solidFill>
+                <a:latin typeface="Arial"/>
+                <a:ea typeface="Arial"/>
+                <a:cs typeface="Arial"/>
+                <a:sym typeface="Arial"/>
+              </a:rPr>
+              <a:t> </a:t>
+            </a:r>
+            <a:r>
+              <a:rPr lang="en-GB" sz="2300" b="1" dirty="0" err="1">
+                <a:solidFill>
+                  <a:schemeClr val="dk1"/>
+                </a:solidFill>
+                <a:latin typeface="Arial"/>
+                <a:ea typeface="Arial"/>
+                <a:cs typeface="Arial"/>
+                <a:sym typeface="Arial"/>
+              </a:rPr>
+              <a:t>untuk</a:t>
+            </a:r>
+            <a:r>
+              <a:rPr lang="en-GB" sz="2300" b="1" dirty="0">
+                <a:solidFill>
+                  <a:schemeClr val="dk1"/>
+                </a:solidFill>
+                <a:latin typeface="Arial"/>
+                <a:ea typeface="Arial"/>
+                <a:cs typeface="Arial"/>
+                <a:sym typeface="Arial"/>
+              </a:rPr>
+              <a:t> pekan </a:t>
+            </a:r>
+            <a:r>
+              <a:rPr lang="en-GB" sz="2300" b="1" dirty="0" err="1">
+                <a:solidFill>
+                  <a:schemeClr val="dk1"/>
+                </a:solidFill>
+                <a:latin typeface="Arial"/>
+                <a:ea typeface="Arial"/>
+                <a:cs typeface="Arial"/>
+                <a:sym typeface="Arial"/>
+              </a:rPr>
+              <a:t>ini</a:t>
+            </a:r>
+            <a:r>
+              <a:rPr lang="en-GB" sz="2300" b="1" dirty="0">
+                <a:solidFill>
+                  <a:schemeClr val="dk1"/>
+                </a:solidFill>
+                <a:latin typeface="Arial"/>
+                <a:ea typeface="Arial"/>
+                <a:cs typeface="Arial"/>
+                <a:sym typeface="Arial"/>
+              </a:rPr>
+              <a:t>.</a:t>
+            </a:r>
+          </a:p>
+          <a:p>
+            <a:endParaRPr lang="en-GB" dirty="0"/>
+          </a:p>
+        </p:txBody>
+      </p:sp>
+      <p:sp>
+        <p:nvSpPr>
+          <p:cNvPr id="17" name="Text Placeholder 16">
+            <a:extLst>
+              <a:ext uri="{FF2B5EF4-FFF2-40B4-BE49-F238E27FC236}">
+                <a16:creationId xmlns:a16="http://schemas.microsoft.com/office/drawing/2014/main" id="{0AEB8855-1D91-BA23-DF54-657A74FFE134}"/>
+              </a:ext>
+            </a:extLst>
+          </p:cNvPr>
+          <p:cNvSpPr>
+            <a:spLocks noGrp="1"/>
+          </p:cNvSpPr>
+          <p:nvPr>
+            <p:ph type="body" sz="quarter" idx="10"/>
+          </p:nvPr>
+        </p:nvSpPr>
+        <p:spPr>
+          <a:xfrm>
+            <a:off x="487363" y="1862767"/>
+            <a:ext cx="5608637" cy="3161671"/>
+          </a:xfrm>
+        </p:spPr>
+        <p:txBody>
+          <a:bodyPr>
+            <a:normAutofit/>
+          </a:bodyPr>
+          <a:lstStyle>
+            <a:lvl1pPr marL="0" indent="0">
+              <a:lnSpc>
+                <a:spcPct val="100000"/>
+              </a:lnSpc>
+              <a:buNone/>
+              <a:defRPr sz="2300" b="1">
+                <a:solidFill>
+                  <a:schemeClr val="tx1"/>
+                </a:solidFill>
+              </a:defRPr>
+            </a:lvl1pPr>
+          </a:lstStyle>
+          <a:p>
+            <a:pPr lvl="0"/>
+            <a:endParaRPr lang="en-GB" dirty="0"/>
+          </a:p>
+        </p:txBody>
+      </p:sp>
+      <p:sp>
+        <p:nvSpPr>
+          <p:cNvPr id="18" name="TextBox 17">
+            <a:extLst>
+              <a:ext uri="{FF2B5EF4-FFF2-40B4-BE49-F238E27FC236}">
+                <a16:creationId xmlns:a16="http://schemas.microsoft.com/office/drawing/2014/main" id="{904A318F-5143-D925-5C9B-0378D72D5CEE}"/>
+              </a:ext>
+            </a:extLst>
+          </p:cNvPr>
+          <p:cNvSpPr txBox="1"/>
+          <p:nvPr userDrawn="1"/>
+        </p:nvSpPr>
+        <p:spPr>
+          <a:xfrm>
+            <a:off x="487363" y="1358654"/>
+            <a:ext cx="5608512" cy="446276"/>
+          </a:xfrm>
+          <a:prstGeom prst="rect">
+            <a:avLst/>
+          </a:prstGeom>
+          <a:noFill/>
+        </p:spPr>
+        <p:txBody>
+          <a:bodyPr wrap="square" rtlCol="0">
+            <a:spAutoFit/>
+          </a:bodyPr>
+          <a:lstStyle/>
+          <a:p>
+            <a:pPr marL="0" lvl="0" indent="0" algn="l" rtl="0">
+              <a:lnSpc>
+                <a:spcPct val="100000"/>
+              </a:lnSpc>
+              <a:spcBef>
+                <a:spcPts val="0"/>
+              </a:spcBef>
+              <a:spcAft>
+                <a:spcPts val="0"/>
+              </a:spcAft>
+              <a:buClr>
+                <a:schemeClr val="dk1"/>
+              </a:buClr>
+              <a:buSzPts val="1100"/>
+              <a:buNone/>
+            </a:pPr>
+            <a:r>
+              <a:rPr lang="en-GB" sz="2300" b="1" i="1" dirty="0">
+                <a:solidFill>
+                  <a:srgbClr val="752224"/>
+                </a:solidFill>
+                <a:latin typeface="Arial"/>
+                <a:ea typeface="Arial"/>
+                <a:cs typeface="Arial"/>
+                <a:sym typeface="Arial"/>
+              </a:rPr>
+              <a:t>Birthdays:</a:t>
+            </a:r>
+            <a:endParaRPr lang="en-GB" sz="2300" dirty="0"/>
+          </a:p>
+        </p:txBody>
+      </p:sp>
+      <p:sp>
+        <p:nvSpPr>
+          <p:cNvPr id="19" name="TextBox 18">
+            <a:extLst>
+              <a:ext uri="{FF2B5EF4-FFF2-40B4-BE49-F238E27FC236}">
+                <a16:creationId xmlns:a16="http://schemas.microsoft.com/office/drawing/2014/main" id="{68602B67-24DD-0536-8647-BF662AF8AEC0}"/>
+              </a:ext>
+            </a:extLst>
+          </p:cNvPr>
+          <p:cNvSpPr txBox="1"/>
+          <p:nvPr userDrawn="1"/>
+        </p:nvSpPr>
+        <p:spPr>
+          <a:xfrm>
+            <a:off x="6271491" y="1487055"/>
+            <a:ext cx="5200073" cy="4801314"/>
+          </a:xfrm>
+          <a:prstGeom prst="rect">
+            <a:avLst/>
+          </a:prstGeom>
+          <a:noFill/>
+        </p:spPr>
+        <p:txBody>
+          <a:bodyPr wrap="square" rtlCol="0">
+            <a:spAutoFit/>
+          </a:bodyPr>
+          <a:lstStyle/>
+          <a:p>
+            <a:r>
+              <a:rPr lang="en-GB" sz="2300" b="1" i="1" dirty="0">
+                <a:solidFill>
+                  <a:srgbClr val="752224"/>
+                </a:solidFill>
+              </a:rPr>
+              <a:t>Others:</a:t>
+            </a:r>
+          </a:p>
+          <a:p>
+            <a:r>
+              <a:rPr lang="en-GB" sz="2300" b="1" dirty="0" err="1"/>
+              <a:t>Silahkan</a:t>
+            </a:r>
+            <a:r>
+              <a:rPr lang="en-GB" sz="2300" b="1" dirty="0"/>
+              <a:t> </a:t>
+            </a:r>
+            <a:r>
+              <a:rPr lang="en-GB" sz="2300" b="1" dirty="0" err="1"/>
+              <a:t>disampaikan</a:t>
+            </a:r>
+            <a:r>
+              <a:rPr lang="en-GB" sz="2300" b="1" dirty="0"/>
+              <a:t> </a:t>
+            </a:r>
+            <a:r>
+              <a:rPr lang="en-GB" sz="2300" b="1" dirty="0" err="1"/>
+              <a:t>ke</a:t>
+            </a:r>
+            <a:r>
+              <a:rPr lang="en-GB" sz="2300" b="1" dirty="0"/>
+              <a:t> </a:t>
+            </a:r>
+            <a:r>
+              <a:rPr lang="en-GB" sz="2300" b="1" dirty="0" err="1"/>
+              <a:t>Seksi</a:t>
+            </a:r>
+            <a:r>
+              <a:rPr lang="en-GB" sz="2300" b="1" dirty="0"/>
+              <a:t> </a:t>
+            </a:r>
+            <a:r>
+              <a:rPr lang="en-GB" sz="2300" b="1" dirty="0" err="1"/>
+              <a:t>Liturgi</a:t>
+            </a:r>
+            <a:r>
+              <a:rPr lang="en-GB" sz="2300" b="1" dirty="0"/>
+              <a:t> </a:t>
+            </a:r>
+            <a:r>
+              <a:rPr lang="en-GB" sz="2300" b="1" dirty="0" err="1"/>
+              <a:t>atau</a:t>
+            </a:r>
+            <a:r>
+              <a:rPr lang="en-GB" sz="2300" b="1" dirty="0"/>
+              <a:t> </a:t>
+            </a:r>
+            <a:r>
+              <a:rPr lang="en-GB" sz="2300" b="1" dirty="0" err="1"/>
+              <a:t>ke</a:t>
+            </a:r>
+            <a:r>
+              <a:rPr lang="en-GB" sz="2300" b="1" dirty="0"/>
+              <a:t> Pastor </a:t>
+            </a:r>
+            <a:r>
+              <a:rPr lang="en-GB" sz="2300" b="1" dirty="0" err="1"/>
+              <a:t>bagi</a:t>
+            </a:r>
+            <a:r>
+              <a:rPr lang="en-GB" sz="2300" b="1" dirty="0"/>
+              <a:t> yang </a:t>
+            </a:r>
+            <a:r>
+              <a:rPr lang="en-GB" sz="2300" b="1" dirty="0" err="1"/>
+              <a:t>mempunyai</a:t>
+            </a:r>
+            <a:r>
+              <a:rPr lang="en-GB" sz="2300" b="1" dirty="0"/>
+              <a:t> </a:t>
+            </a:r>
+            <a:r>
+              <a:rPr lang="en-GB" sz="2300" b="1" dirty="0" err="1">
+                <a:highlight>
+                  <a:srgbClr val="00FF00"/>
+                </a:highlight>
+              </a:rPr>
+              <a:t>Intensi</a:t>
+            </a:r>
+            <a:r>
+              <a:rPr lang="en-GB" sz="2300" b="1" dirty="0">
+                <a:highlight>
+                  <a:srgbClr val="00FF00"/>
+                </a:highlight>
+              </a:rPr>
+              <a:t> </a:t>
+            </a:r>
+            <a:r>
+              <a:rPr lang="en-GB" sz="2300" b="1" dirty="0" err="1">
+                <a:highlight>
+                  <a:srgbClr val="00FF00"/>
+                </a:highlight>
+              </a:rPr>
+              <a:t>Khusus</a:t>
+            </a:r>
+            <a:r>
+              <a:rPr lang="en-GB" sz="2300" b="1" dirty="0"/>
+              <a:t>.</a:t>
+            </a:r>
+          </a:p>
+          <a:p>
+            <a:endParaRPr lang="en-GB" sz="1500" b="1" dirty="0"/>
+          </a:p>
+          <a:p>
+            <a:r>
+              <a:rPr lang="en-GB" sz="2300" b="1" dirty="0" err="1"/>
+              <a:t>Untuk</a:t>
+            </a:r>
+            <a:r>
+              <a:rPr lang="en-GB" sz="2300" b="1" dirty="0"/>
+              <a:t> </a:t>
+            </a:r>
+            <a:r>
+              <a:rPr lang="en-GB" sz="2300" b="1" dirty="0" err="1"/>
+              <a:t>intensi</a:t>
+            </a:r>
+            <a:r>
+              <a:rPr lang="en-GB" sz="2300" b="1" dirty="0"/>
+              <a:t> </a:t>
+            </a:r>
+            <a:r>
+              <a:rPr lang="en-GB" sz="2300" b="1" dirty="0" err="1"/>
+              <a:t>minggu</a:t>
+            </a:r>
+            <a:r>
+              <a:rPr lang="en-GB" sz="2300" b="1" dirty="0"/>
+              <a:t> yang </a:t>
+            </a:r>
+            <a:r>
+              <a:rPr lang="en-GB" sz="2300" b="1" dirty="0" err="1"/>
+              <a:t>akan</a:t>
+            </a:r>
+            <a:r>
+              <a:rPr lang="en-GB" sz="2300" b="1" dirty="0"/>
+              <a:t> </a:t>
+            </a:r>
+            <a:r>
+              <a:rPr lang="en-GB" sz="2300" b="1" dirty="0" err="1"/>
+              <a:t>datang</a:t>
+            </a:r>
+            <a:r>
+              <a:rPr lang="en-GB" sz="2300" b="1" dirty="0"/>
+              <a:t> </a:t>
+            </a:r>
+            <a:r>
+              <a:rPr lang="en-GB" sz="2300" b="1" dirty="0" err="1"/>
+              <a:t>dapat</a:t>
+            </a:r>
+            <a:r>
+              <a:rPr lang="en-GB" sz="2300" b="1" dirty="0"/>
+              <a:t> juga </a:t>
+            </a:r>
+            <a:r>
+              <a:rPr lang="en-GB" sz="2300" b="1" dirty="0" err="1"/>
+              <a:t>disampaikan</a:t>
+            </a:r>
+            <a:r>
+              <a:rPr lang="en-GB" sz="2300" b="1" dirty="0"/>
+              <a:t> </a:t>
+            </a:r>
+            <a:r>
+              <a:rPr lang="en-GB" sz="2300" b="1" dirty="0" err="1"/>
+              <a:t>ke</a:t>
+            </a:r>
+            <a:r>
+              <a:rPr lang="en-GB" sz="2300" b="1" dirty="0"/>
+              <a:t> </a:t>
+            </a:r>
+            <a:r>
+              <a:rPr lang="en-GB" sz="2300" b="1" dirty="0" err="1"/>
+              <a:t>seksi</a:t>
+            </a:r>
+            <a:r>
+              <a:rPr lang="en-GB" sz="2300" b="1" dirty="0"/>
+              <a:t> </a:t>
+            </a:r>
+            <a:r>
+              <a:rPr lang="en-GB" sz="2300" b="1" dirty="0" err="1"/>
+              <a:t>liturgi</a:t>
+            </a:r>
+            <a:r>
+              <a:rPr lang="en-GB" sz="2300" b="1" dirty="0"/>
+              <a:t>.</a:t>
+            </a:r>
+          </a:p>
+          <a:p>
+            <a:endParaRPr lang="en-GB" sz="1500" b="1" dirty="0"/>
+          </a:p>
+          <a:p>
+            <a:r>
+              <a:rPr lang="en-GB" sz="2300" b="1" dirty="0" err="1"/>
+              <a:t>Terima</a:t>
+            </a:r>
+            <a:r>
+              <a:rPr lang="en-GB" sz="2300" b="1" dirty="0"/>
+              <a:t> </a:t>
+            </a:r>
+            <a:r>
+              <a:rPr lang="en-GB" sz="2300" b="1" dirty="0" err="1"/>
+              <a:t>kasih</a:t>
+            </a:r>
+            <a:r>
+              <a:rPr lang="en-GB" sz="2300" b="1" dirty="0"/>
+              <a:t>.</a:t>
+            </a:r>
+          </a:p>
+          <a:p>
+            <a:endParaRPr lang="en-GB" sz="1500" b="1" dirty="0"/>
+          </a:p>
+          <a:p>
+            <a:r>
+              <a:rPr lang="en-GB" sz="2300" b="1" dirty="0" err="1"/>
+              <a:t>Seksi</a:t>
+            </a:r>
+            <a:r>
+              <a:rPr lang="en-GB" sz="2300" b="1" dirty="0"/>
+              <a:t> </a:t>
+            </a:r>
+            <a:r>
+              <a:rPr lang="en-GB" sz="2300" b="1" dirty="0" err="1"/>
+              <a:t>Liturgi</a:t>
+            </a:r>
+            <a:r>
+              <a:rPr lang="en-GB" sz="2300" b="1" dirty="0"/>
+              <a:t>:</a:t>
+            </a:r>
+          </a:p>
+          <a:p>
+            <a:r>
+              <a:rPr lang="en-GB" sz="2300" b="1" dirty="0">
+                <a:highlight>
+                  <a:srgbClr val="FFFF00"/>
+                </a:highlight>
+              </a:rPr>
+              <a:t>Sugi Alwi:      0411 125 748</a:t>
+            </a:r>
+          </a:p>
+          <a:p>
+            <a:r>
+              <a:rPr lang="en-GB" sz="2300" b="1" dirty="0">
+                <a:highlight>
+                  <a:srgbClr val="FFFF00"/>
+                </a:highlight>
+              </a:rPr>
+              <a:t>Kevin </a:t>
+            </a:r>
+            <a:r>
+              <a:rPr lang="en-GB" sz="2300" b="1" dirty="0" err="1">
+                <a:highlight>
+                  <a:srgbClr val="FFFF00"/>
+                </a:highlight>
+              </a:rPr>
+              <a:t>Sanly</a:t>
+            </a:r>
+            <a:r>
+              <a:rPr lang="en-GB" sz="2300" b="1" dirty="0">
+                <a:highlight>
+                  <a:srgbClr val="FFFF00"/>
+                </a:highlight>
+              </a:rPr>
+              <a:t>:  0491 673 556 </a:t>
+            </a:r>
+          </a:p>
+        </p:txBody>
+      </p:sp>
+    </p:spTree>
+    <p:extLst>
+      <p:ext uri="{BB962C8B-B14F-4D97-AF65-F5344CB8AC3E}">
+        <p14:creationId xmlns:p14="http://schemas.microsoft.com/office/powerpoint/2010/main" val="4043469499"/>
+      </p:ext>
+    </p:extLst>
+  </p:cSld>
+  <p:clrMapOvr>
+    <a:masterClrMapping/>
+  </p:clrMapOvr>
+</p:sldLayout>
+</file>
+
 <file path=ppt/slideLayouts/slideLayout2.xml><?xml version="1.0" encoding="utf-8"?>
 <p:sldLayout xmlns:a="http://schemas.openxmlformats.org/drawingml/2006/main" xmlns:r="http://schemas.openxmlformats.org/officeDocument/2006/relationships" xmlns:p="http://schemas.openxmlformats.org/presentationml/2006/main" matchingName="Title only" type="titleOnly">
   <p:cSld name="TITLE_ONLY">
@@ -5920,7 +7239,7 @@
         <p:spPr>
           <a:xfrm>
             <a:off x="311150" y="831850"/>
-            <a:ext cx="2174875" cy="485775"/>
+            <a:ext cx="2271713" cy="485775"/>
           </a:xfrm>
         </p:spPr>
         <p:txBody>
@@ -7158,6 +8477,7 @@
     <p:sldLayoutId id="2147483661" r:id="rId9"/>
     <p:sldLayoutId id="2147483662" r:id="rId10"/>
     <p:sldLayoutId id="2147483663" r:id="rId11"/>
+    <p:sldLayoutId id="2147483664" r:id="rId12"/>
   </p:sldLayoutIdLst>
   <p:hf sldNum="0" hdr="0" ftr="0" dt="0"/>
   <p:txStyles>

</xml_diff>